<commit_message>
voorbladen voor mangae en controle
</commit_message>
<xml_diff>
--- a/documentatie/scrum presentaties/Sprint5.pptx
+++ b/documentatie/scrum presentaties/Sprint5.pptx
@@ -866,7 +866,7 @@
           <a:p>
             <a:fld id="{CCAA94E9-41BC-4F25-AE4A-7ACB44B440F3}" type="datetimeFigureOut">
               <a:rPr lang="en-NL" smtClean="0"/>
-              <a:t>09/12/2025</a:t>
+              <a:t>12/09/2025</a:t>
             </a:fld>
             <a:endParaRPr lang="en-NL"/>
           </a:p>
@@ -908,7 +908,7 @@
           <a:p>
             <a:fld id="{73C0B678-65BA-466A-8A83-882FB560368C}" type="slidenum">
               <a:rPr lang="en-NL" smtClean="0"/>
-              <a:t>‹#›</a:t>
+              <a:t>‹nr.›</a:t>
             </a:fld>
             <a:endParaRPr lang="en-NL"/>
           </a:p>
@@ -1117,7 +1117,7 @@
           <a:p>
             <a:fld id="{CCAA94E9-41BC-4F25-AE4A-7ACB44B440F3}" type="datetimeFigureOut">
               <a:rPr lang="en-NL" smtClean="0"/>
-              <a:t>09/12/2025</a:t>
+              <a:t>12/09/2025</a:t>
             </a:fld>
             <a:endParaRPr lang="en-NL"/>
           </a:p>
@@ -1159,7 +1159,7 @@
           <a:p>
             <a:fld id="{73C0B678-65BA-466A-8A83-882FB560368C}" type="slidenum">
               <a:rPr lang="en-NL" smtClean="0"/>
-              <a:t>‹#›</a:t>
+              <a:t>‹nr.›</a:t>
             </a:fld>
             <a:endParaRPr lang="en-NL"/>
           </a:p>
@@ -1431,7 +1431,7 @@
           <a:p>
             <a:fld id="{CCAA94E9-41BC-4F25-AE4A-7ACB44B440F3}" type="datetimeFigureOut">
               <a:rPr lang="en-NL" smtClean="0"/>
-              <a:t>09/12/2025</a:t>
+              <a:t>12/09/2025</a:t>
             </a:fld>
             <a:endParaRPr lang="en-NL"/>
           </a:p>
@@ -1473,7 +1473,7 @@
           <a:p>
             <a:fld id="{73C0B678-65BA-466A-8A83-882FB560368C}" type="slidenum">
               <a:rPr lang="en-NL" smtClean="0"/>
-              <a:t>‹#›</a:t>
+              <a:t>‹nr.›</a:t>
             </a:fld>
             <a:endParaRPr lang="en-NL"/>
           </a:p>
@@ -1764,7 +1764,7 @@
           <a:p>
             <a:fld id="{CCAA94E9-41BC-4F25-AE4A-7ACB44B440F3}" type="datetimeFigureOut">
               <a:rPr lang="en-NL" smtClean="0"/>
-              <a:t>09/12/2025</a:t>
+              <a:t>12/09/2025</a:t>
             </a:fld>
             <a:endParaRPr lang="en-NL"/>
           </a:p>
@@ -1806,7 +1806,7 @@
           <a:p>
             <a:fld id="{73C0B678-65BA-466A-8A83-882FB560368C}" type="slidenum">
               <a:rPr lang="en-NL" smtClean="0"/>
-              <a:t>‹#›</a:t>
+              <a:t>‹nr.›</a:t>
             </a:fld>
             <a:endParaRPr lang="en-NL"/>
           </a:p>
@@ -2078,7 +2078,7 @@
           <a:p>
             <a:fld id="{CCAA94E9-41BC-4F25-AE4A-7ACB44B440F3}" type="datetimeFigureOut">
               <a:rPr lang="en-NL" smtClean="0"/>
-              <a:t>09/12/2025</a:t>
+              <a:t>12/09/2025</a:t>
             </a:fld>
             <a:endParaRPr lang="en-NL"/>
           </a:p>
@@ -2120,7 +2120,7 @@
           <a:p>
             <a:fld id="{73C0B678-65BA-466A-8A83-882FB560368C}" type="slidenum">
               <a:rPr lang="en-NL" smtClean="0"/>
-              <a:t>‹#›</a:t>
+              <a:t>‹nr.›</a:t>
             </a:fld>
             <a:endParaRPr lang="en-NL"/>
           </a:p>
@@ -2471,7 +2471,7 @@
           <a:p>
             <a:fld id="{CCAA94E9-41BC-4F25-AE4A-7ACB44B440F3}" type="datetimeFigureOut">
               <a:rPr lang="en-NL" smtClean="0"/>
-              <a:t>09/12/2025</a:t>
+              <a:t>12/09/2025</a:t>
             </a:fld>
             <a:endParaRPr lang="en-NL"/>
           </a:p>
@@ -2513,7 +2513,7 @@
           <a:p>
             <a:fld id="{73C0B678-65BA-466A-8A83-882FB560368C}" type="slidenum">
               <a:rPr lang="en-NL" smtClean="0"/>
-              <a:t>‹#›</a:t>
+              <a:t>‹nr.›</a:t>
             </a:fld>
             <a:endParaRPr lang="en-NL"/>
           </a:p>
@@ -2641,7 +2641,7 @@
           <a:p>
             <a:fld id="{CCAA94E9-41BC-4F25-AE4A-7ACB44B440F3}" type="datetimeFigureOut">
               <a:rPr lang="en-NL" smtClean="0"/>
-              <a:t>09/12/2025</a:t>
+              <a:t>12/09/2025</a:t>
             </a:fld>
             <a:endParaRPr lang="en-NL"/>
           </a:p>
@@ -2683,7 +2683,7 @@
           <a:p>
             <a:fld id="{73C0B678-65BA-466A-8A83-882FB560368C}" type="slidenum">
               <a:rPr lang="en-NL" smtClean="0"/>
-              <a:t>‹#›</a:t>
+              <a:t>‹nr.›</a:t>
             </a:fld>
             <a:endParaRPr lang="en-NL"/>
           </a:p>
@@ -2821,7 +2821,7 @@
           <a:p>
             <a:fld id="{CCAA94E9-41BC-4F25-AE4A-7ACB44B440F3}" type="datetimeFigureOut">
               <a:rPr lang="en-NL" smtClean="0"/>
-              <a:t>09/12/2025</a:t>
+              <a:t>12/09/2025</a:t>
             </a:fld>
             <a:endParaRPr lang="en-NL"/>
           </a:p>
@@ -2863,7 +2863,7 @@
           <a:p>
             <a:fld id="{73C0B678-65BA-466A-8A83-882FB560368C}" type="slidenum">
               <a:rPr lang="en-NL" smtClean="0"/>
-              <a:t>‹#›</a:t>
+              <a:t>‹nr.›</a:t>
             </a:fld>
             <a:endParaRPr lang="en-NL"/>
           </a:p>
@@ -2991,7 +2991,7 @@
           <a:p>
             <a:fld id="{CCAA94E9-41BC-4F25-AE4A-7ACB44B440F3}" type="datetimeFigureOut">
               <a:rPr lang="en-NL" smtClean="0"/>
-              <a:t>09/12/2025</a:t>
+              <a:t>12/09/2025</a:t>
             </a:fld>
             <a:endParaRPr lang="en-NL"/>
           </a:p>
@@ -3033,7 +3033,7 @@
           <a:p>
             <a:fld id="{73C0B678-65BA-466A-8A83-882FB560368C}" type="slidenum">
               <a:rPr lang="en-NL" smtClean="0"/>
-              <a:t>‹#›</a:t>
+              <a:t>‹nr.›</a:t>
             </a:fld>
             <a:endParaRPr lang="en-NL"/>
           </a:p>
@@ -3238,7 +3238,7 @@
           <a:p>
             <a:fld id="{CCAA94E9-41BC-4F25-AE4A-7ACB44B440F3}" type="datetimeFigureOut">
               <a:rPr lang="en-NL" smtClean="0"/>
-              <a:t>09/12/2025</a:t>
+              <a:t>12/09/2025</a:t>
             </a:fld>
             <a:endParaRPr lang="en-NL"/>
           </a:p>
@@ -3280,7 +3280,7 @@
           <a:p>
             <a:fld id="{73C0B678-65BA-466A-8A83-882FB560368C}" type="slidenum">
               <a:rPr lang="en-NL" smtClean="0"/>
-              <a:t>‹#›</a:t>
+              <a:t>‹nr.›</a:t>
             </a:fld>
             <a:endParaRPr lang="en-NL"/>
           </a:p>
@@ -3470,7 +3470,7 @@
           <a:p>
             <a:fld id="{CCAA94E9-41BC-4F25-AE4A-7ACB44B440F3}" type="datetimeFigureOut">
               <a:rPr lang="en-NL" smtClean="0"/>
-              <a:t>09/12/2025</a:t>
+              <a:t>12/09/2025</a:t>
             </a:fld>
             <a:endParaRPr lang="en-NL"/>
           </a:p>
@@ -3512,7 +3512,7 @@
           <a:p>
             <a:fld id="{73C0B678-65BA-466A-8A83-882FB560368C}" type="slidenum">
               <a:rPr lang="en-NL" smtClean="0"/>
-              <a:t>‹#›</a:t>
+              <a:t>‹nr.›</a:t>
             </a:fld>
             <a:endParaRPr lang="en-NL"/>
           </a:p>
@@ -3844,7 +3844,7 @@
           <a:p>
             <a:fld id="{CCAA94E9-41BC-4F25-AE4A-7ACB44B440F3}" type="datetimeFigureOut">
               <a:rPr lang="en-NL" smtClean="0"/>
-              <a:t>09/12/2025</a:t>
+              <a:t>12/09/2025</a:t>
             </a:fld>
             <a:endParaRPr lang="en-NL"/>
           </a:p>
@@ -3886,7 +3886,7 @@
           <a:p>
             <a:fld id="{73C0B678-65BA-466A-8A83-882FB560368C}" type="slidenum">
               <a:rPr lang="en-NL" smtClean="0"/>
-              <a:t>‹#›</a:t>
+              <a:t>‹nr.›</a:t>
             </a:fld>
             <a:endParaRPr lang="en-NL"/>
           </a:p>
@@ -3967,7 +3967,7 @@
           <a:p>
             <a:fld id="{CCAA94E9-41BC-4F25-AE4A-7ACB44B440F3}" type="datetimeFigureOut">
               <a:rPr lang="en-NL" smtClean="0"/>
-              <a:t>09/12/2025</a:t>
+              <a:t>12/09/2025</a:t>
             </a:fld>
             <a:endParaRPr lang="en-NL"/>
           </a:p>
@@ -4009,7 +4009,7 @@
           <a:p>
             <a:fld id="{73C0B678-65BA-466A-8A83-882FB560368C}" type="slidenum">
               <a:rPr lang="en-NL" smtClean="0"/>
-              <a:t>‹#›</a:t>
+              <a:t>‹nr.›</a:t>
             </a:fld>
             <a:endParaRPr lang="en-NL"/>
           </a:p>
@@ -4062,7 +4062,7 @@
           <a:p>
             <a:fld id="{CCAA94E9-41BC-4F25-AE4A-7ACB44B440F3}" type="datetimeFigureOut">
               <a:rPr lang="en-NL" smtClean="0"/>
-              <a:t>09/12/2025</a:t>
+              <a:t>12/09/2025</a:t>
             </a:fld>
             <a:endParaRPr lang="en-NL"/>
           </a:p>
@@ -4104,7 +4104,7 @@
           <a:p>
             <a:fld id="{73C0B678-65BA-466A-8A83-882FB560368C}" type="slidenum">
               <a:rPr lang="en-NL" smtClean="0"/>
-              <a:t>‹#›</a:t>
+              <a:t>‹nr.›</a:t>
             </a:fld>
             <a:endParaRPr lang="en-NL"/>
           </a:p>
@@ -4317,7 +4317,7 @@
           <a:p>
             <a:fld id="{CCAA94E9-41BC-4F25-AE4A-7ACB44B440F3}" type="datetimeFigureOut">
               <a:rPr lang="en-NL" smtClean="0"/>
-              <a:t>09/12/2025</a:t>
+              <a:t>12/09/2025</a:t>
             </a:fld>
             <a:endParaRPr lang="en-NL"/>
           </a:p>
@@ -4359,7 +4359,7 @@
           <a:p>
             <a:fld id="{73C0B678-65BA-466A-8A83-882FB560368C}" type="slidenum">
               <a:rPr lang="en-NL" smtClean="0"/>
-              <a:t>‹#›</a:t>
+              <a:t>‹nr.›</a:t>
             </a:fld>
             <a:endParaRPr lang="en-NL"/>
           </a:p>
@@ -4599,7 +4599,7 @@
           <a:p>
             <a:fld id="{73C0B678-65BA-466A-8A83-882FB560368C}" type="slidenum">
               <a:rPr lang="en-NL" smtClean="0"/>
-              <a:t>‹#›</a:t>
+              <a:t>‹nr.›</a:t>
             </a:fld>
             <a:endParaRPr lang="en-NL"/>
           </a:p>
@@ -4622,7 +4622,7 @@
           <a:p>
             <a:fld id="{CCAA94E9-41BC-4F25-AE4A-7ACB44B440F3}" type="datetimeFigureOut">
               <a:rPr lang="en-NL" smtClean="0"/>
-              <a:t>09/12/2025</a:t>
+              <a:t>12/09/2025</a:t>
             </a:fld>
             <a:endParaRPr lang="en-NL"/>
           </a:p>
@@ -5324,7 +5324,7 @@
           <a:p>
             <a:fld id="{CCAA94E9-41BC-4F25-AE4A-7ACB44B440F3}" type="datetimeFigureOut">
               <a:rPr lang="en-NL" smtClean="0"/>
-              <a:t>09/12/2025</a:t>
+              <a:t>12/09/2025</a:t>
             </a:fld>
             <a:endParaRPr lang="en-NL"/>
           </a:p>
@@ -5400,7 +5400,7 @@
           <a:p>
             <a:fld id="{73C0B678-65BA-466A-8A83-882FB560368C}" type="slidenum">
               <a:rPr lang="en-NL" smtClean="0"/>
-              <a:t>‹#›</a:t>
+              <a:t>‹nr.›</a:t>
             </a:fld>
             <a:endParaRPr lang="en-NL"/>
           </a:p>
@@ -7198,17 +7198,6 @@
           <a:p>
             <a:r>
               <a:rPr lang="nl-NL" dirty="0"/>
-              <a:t>DNS </a:t>
-            </a:r>
-            <a:r>
-              <a:rPr lang="en-US" dirty="0"/>
-              <a:t>(Domain Name System)</a:t>
-            </a:r>
-            <a:endParaRPr lang="nl-NL" dirty="0"/>
-          </a:p>
-          <a:p>
-            <a:r>
-              <a:rPr lang="nl-NL" dirty="0"/>
               <a:t>SSH (</a:t>
             </a:r>
             <a:r>
@@ -7222,6 +7211,21 @@
               <a:rPr lang="nl-NL" dirty="0"/>
               <a:t>VNC (Virtual Network Computing)</a:t>
             </a:r>
+          </a:p>
+          <a:p>
+            <a:r>
+              <a:rPr lang="nl-NL" dirty="0"/>
+              <a:t>DNS </a:t>
+            </a:r>
+            <a:r>
+              <a:rPr lang="en-US" dirty="0"/>
+              <a:t>(Domain Name </a:t>
+            </a:r>
+            <a:r>
+              <a:rPr lang="en-US"/>
+              <a:t>System)</a:t>
+            </a:r>
+            <a:endParaRPr lang="nl-NL" dirty="0"/>
           </a:p>
           <a:p>
             <a:pPr marL="0" indent="0">

</xml_diff>